<commit_message>
UserWorkspace: reviewed update workspace implementation
</commit_message>
<xml_diff>
--- a/docs/MediaManagementSystem-v.4.pptx
+++ b/docs/MediaManagementSystem-v.4.pptx
@@ -4124,7 +4124,7 @@
         <p:spPr>
           <a:xfrm>
             <a:off x="11292840" y="0"/>
-            <a:ext cx="912600" cy="6856200"/>
+            <a:ext cx="911520" cy="6855120"/>
           </a:xfrm>
           <a:prstGeom prst="rect">
             <a:avLst/>
@@ -4162,7 +4162,7 @@
         <p:spPr>
           <a:xfrm>
             <a:off x="0" y="0"/>
-            <a:ext cx="455400" cy="6856200"/>
+            <a:ext cx="454320" cy="6855120"/>
           </a:xfrm>
           <a:prstGeom prst="rect">
             <a:avLst/>
@@ -4458,7 +4458,7 @@
         <p:spPr>
           <a:xfrm>
             <a:off x="11292840" y="0"/>
-            <a:ext cx="912600" cy="6856200"/>
+            <a:ext cx="911520" cy="6855120"/>
           </a:xfrm>
           <a:prstGeom prst="rect">
             <a:avLst/>
@@ -4756,7 +4756,7 @@
         <p:spPr>
           <a:xfrm>
             <a:off x="11292840" y="0"/>
-            <a:ext cx="912600" cy="6856200"/>
+            <a:ext cx="911520" cy="6855120"/>
           </a:xfrm>
           <a:prstGeom prst="rect">
             <a:avLst/>
@@ -5046,8 +5046,8 @@
         </p:nvSpPr>
         <p:spPr>
           <a:xfrm>
-            <a:off x="1261800" y="758880"/>
-            <a:ext cx="9416520" cy="4039920"/>
+            <a:off x="1261800" y="2834640"/>
+            <a:ext cx="9415440" cy="1280160"/>
           </a:xfrm>
           <a:prstGeom prst="rect">
             <a:avLst/>
@@ -5097,8 +5097,8 @@
         </p:nvSpPr>
         <p:spPr>
           <a:xfrm>
-            <a:off x="1261800" y="4800600"/>
-            <a:ext cx="9416520" cy="1689840"/>
+            <a:off x="1261800" y="4260600"/>
+            <a:ext cx="9415440" cy="677160"/>
           </a:xfrm>
           <a:prstGeom prst="rect">
             <a:avLst/>
@@ -5144,6 +5144,95 @@
               <a:t>Media Management System</a:t>
             </a:r>
             <a:endParaRPr b="0" lang="en-US" sz="2200" spc="-1" strike="noStrike">
+              <a:latin typeface="Arial"/>
+            </a:endParaRPr>
+          </a:p>
+        </p:txBody>
+      </p:sp>
+      <p:sp>
+        <p:nvSpPr>
+          <p:cNvPr id="120" name="CustomShape 3"/>
+          <p:cNvSpPr/>
+          <p:nvPr/>
+        </p:nvSpPr>
+        <p:spPr>
+          <a:xfrm>
+            <a:off x="8245800" y="5649120"/>
+            <a:ext cx="3649320" cy="923760"/>
+          </a:xfrm>
+          <a:prstGeom prst="rect">
+            <a:avLst/>
+          </a:prstGeom>
+          <a:noFill/>
+          <a:ln>
+            <a:noFill/>
+          </a:ln>
+        </p:spPr>
+        <p:style>
+          <a:lnRef idx="0"/>
+          <a:fillRef idx="0"/>
+          <a:effectRef idx="0"/>
+          <a:fontRef idx="minor"/>
+        </p:style>
+        <p:txBody>
+          <a:bodyPr lIns="90000" rIns="90000" tIns="45000" bIns="45000">
+            <a:noAutofit/>
+          </a:bodyPr>
+          <a:p>
+            <a:pPr>
+              <a:lnSpc>
+                <a:spcPct val="95000"/>
+              </a:lnSpc>
+              <a:spcBef>
+                <a:spcPts val="1400"/>
+              </a:spcBef>
+              <a:spcAft>
+                <a:spcPts val="201"/>
+              </a:spcAft>
+              <a:tabLst>
+                <a:tab algn="l" pos="0"/>
+              </a:tabLst>
+            </a:pPr>
+            <a:r>
+              <a:rPr b="0" lang="it-CH" sz="1600" spc="-1" strike="noStrike">
+                <a:solidFill>
+                  <a:srgbClr val="bfbfbf"/>
+                </a:solidFill>
+                <a:latin typeface="Century Schoolbook"/>
+                <a:ea typeface="DejaVu Sans"/>
+              </a:rPr>
+              <a:t>technical.support@cloud-mms.com</a:t>
+            </a:r>
+            <a:endParaRPr b="0" lang="en-US" sz="1600" spc="-1" strike="noStrike">
+              <a:latin typeface="Arial"/>
+            </a:endParaRPr>
+          </a:p>
+          <a:p>
+            <a:pPr>
+              <a:lnSpc>
+                <a:spcPct val="95000"/>
+              </a:lnSpc>
+              <a:spcBef>
+                <a:spcPts val="1400"/>
+              </a:spcBef>
+              <a:spcAft>
+                <a:spcPts val="201"/>
+              </a:spcAft>
+              <a:tabLst>
+                <a:tab algn="l" pos="0"/>
+              </a:tabLst>
+            </a:pPr>
+            <a:r>
+              <a:rPr b="0" lang="it-CH" sz="1600" spc="-1" strike="noStrike">
+                <a:solidFill>
+                  <a:srgbClr val="bfbfbf"/>
+                </a:solidFill>
+                <a:latin typeface="Century Schoolbook"/>
+                <a:ea typeface="DejaVu Sans"/>
+              </a:rPr>
+              <a:t>https://gui.cloud-mms.com</a:t>
+            </a:r>
+            <a:endParaRPr b="0" lang="en-US" sz="1600" spc="-1" strike="noStrike">
               <a:latin typeface="Arial"/>
             </a:endParaRPr>
           </a:p>
@@ -5181,14 +5270,14 @@
       </p:grpSpPr>
       <p:sp>
         <p:nvSpPr>
-          <p:cNvPr id="143" name="CustomShape 1"/>
+          <p:cNvPr id="144" name="CustomShape 1"/>
           <p:cNvSpPr/>
           <p:nvPr/>
         </p:nvSpPr>
         <p:spPr>
           <a:xfrm>
             <a:off x="1261800" y="365760"/>
-            <a:ext cx="9690840" cy="1323720"/>
+            <a:ext cx="9689760" cy="1322640"/>
           </a:xfrm>
           <a:prstGeom prst="rect">
             <a:avLst/>
@@ -5232,14 +5321,14 @@
       </p:sp>
       <p:sp>
         <p:nvSpPr>
-          <p:cNvPr id="144" name="CustomShape 2"/>
+          <p:cNvPr id="145" name="CustomShape 2"/>
           <p:cNvSpPr/>
           <p:nvPr/>
         </p:nvSpPr>
         <p:spPr>
           <a:xfrm>
             <a:off x="1261800" y="1828800"/>
-            <a:ext cx="8593560" cy="4349520"/>
+            <a:ext cx="8592480" cy="4348440"/>
           </a:xfrm>
           <a:prstGeom prst="rect">
             <a:avLst/>
@@ -5260,7 +5349,7 @@
             <a:normAutofit/>
           </a:bodyPr>
           <a:p>
-            <a:pPr lvl="4" marL="628560" indent="-188640">
+            <a:pPr lvl="4" marL="628560" indent="-187560">
               <a:lnSpc>
                 <a:spcPct val="150000"/>
               </a:lnSpc>
@@ -5288,7 +5377,7 @@
             </a:endParaRPr>
           </a:p>
           <a:p>
-            <a:pPr lvl="4" marL="628560" indent="-188640">
+            <a:pPr lvl="4" marL="628560" indent="-187560">
               <a:lnSpc>
                 <a:spcPct val="150000"/>
               </a:lnSpc>
@@ -5316,7 +5405,7 @@
             </a:endParaRPr>
           </a:p>
           <a:p>
-            <a:pPr lvl="4" marL="628560" indent="-188640">
+            <a:pPr lvl="4" marL="628560" indent="-187560">
               <a:lnSpc>
                 <a:spcPct val="150000"/>
               </a:lnSpc>
@@ -5344,7 +5433,7 @@
             </a:endParaRPr>
           </a:p>
           <a:p>
-            <a:pPr lvl="4" marL="628560" indent="-188640">
+            <a:pPr lvl="4" marL="628560" indent="-187560">
               <a:lnSpc>
                 <a:spcPct val="150000"/>
               </a:lnSpc>
@@ -5372,7 +5461,7 @@
             </a:endParaRPr>
           </a:p>
           <a:p>
-            <a:pPr lvl="4" marL="628560" indent="-188640">
+            <a:pPr lvl="4" marL="628560" indent="-187560">
               <a:lnSpc>
                 <a:spcPct val="150000"/>
               </a:lnSpc>
@@ -5400,7 +5489,7 @@
             </a:endParaRPr>
           </a:p>
           <a:p>
-            <a:pPr lvl="4" marL="628560" indent="-188640">
+            <a:pPr lvl="4" marL="628560" indent="-187560">
               <a:lnSpc>
                 <a:spcPct val="150000"/>
               </a:lnSpc>
@@ -5480,14 +5569,14 @@
       </p:grpSpPr>
       <p:sp>
         <p:nvSpPr>
-          <p:cNvPr id="120" name="CustomShape 1"/>
+          <p:cNvPr id="121" name="CustomShape 1"/>
           <p:cNvSpPr/>
           <p:nvPr/>
         </p:nvSpPr>
         <p:spPr>
           <a:xfrm>
             <a:off x="1261800" y="365760"/>
-            <a:ext cx="9690840" cy="1323720"/>
+            <a:ext cx="9689760" cy="1322640"/>
           </a:xfrm>
           <a:prstGeom prst="rect">
             <a:avLst/>
@@ -5531,14 +5620,14 @@
       </p:sp>
       <p:sp>
         <p:nvSpPr>
-          <p:cNvPr id="121" name="CustomShape 2"/>
+          <p:cNvPr id="122" name="CustomShape 2"/>
           <p:cNvSpPr/>
           <p:nvPr/>
         </p:nvSpPr>
         <p:spPr>
           <a:xfrm>
             <a:off x="1261800" y="1828800"/>
-            <a:ext cx="8593560" cy="4349520"/>
+            <a:ext cx="8592480" cy="4348440"/>
           </a:xfrm>
           <a:prstGeom prst="rect">
             <a:avLst/>
@@ -5572,7 +5661,7 @@
             </a:endParaRPr>
           </a:p>
           <a:p>
-            <a:pPr lvl="4" marL="628560" indent="-188640">
+            <a:pPr lvl="4" marL="628560" indent="-187560">
               <a:lnSpc>
                 <a:spcPct val="150000"/>
               </a:lnSpc>
@@ -5600,7 +5689,7 @@
             </a:endParaRPr>
           </a:p>
           <a:p>
-            <a:pPr lvl="4" marL="628560" indent="-188640">
+            <a:pPr lvl="4" marL="628560" indent="-187560">
               <a:lnSpc>
                 <a:spcPct val="150000"/>
               </a:lnSpc>
@@ -5628,7 +5717,7 @@
             </a:endParaRPr>
           </a:p>
           <a:p>
-            <a:pPr lvl="4" marL="628560" indent="-188640">
+            <a:pPr lvl="4" marL="628560" indent="-187560">
               <a:lnSpc>
                 <a:spcPct val="150000"/>
               </a:lnSpc>
@@ -5656,7 +5745,7 @@
             </a:endParaRPr>
           </a:p>
           <a:p>
-            <a:pPr lvl="4" marL="628560" indent="-188640">
+            <a:pPr lvl="4" marL="628560" indent="-187560">
               <a:lnSpc>
                 <a:spcPct val="150000"/>
               </a:lnSpc>
@@ -5684,7 +5773,7 @@
             </a:endParaRPr>
           </a:p>
           <a:p>
-            <a:pPr lvl="4" marL="628560" indent="-188640">
+            <a:pPr lvl="4" marL="628560" indent="-187560">
               <a:lnSpc>
                 <a:spcPct val="150000"/>
               </a:lnSpc>
@@ -5712,7 +5801,7 @@
             </a:endParaRPr>
           </a:p>
           <a:p>
-            <a:pPr lvl="4" marL="628560" indent="-188640">
+            <a:pPr lvl="4" marL="628560" indent="-187560">
               <a:lnSpc>
                 <a:spcPct val="150000"/>
               </a:lnSpc>
@@ -5740,7 +5829,7 @@
             </a:endParaRPr>
           </a:p>
           <a:p>
-            <a:pPr lvl="4" marL="628560" indent="-188640">
+            <a:pPr lvl="4" marL="628560" indent="-187560">
               <a:lnSpc>
                 <a:spcPct val="150000"/>
               </a:lnSpc>
@@ -5817,14 +5906,14 @@
       </p:grpSpPr>
       <p:sp>
         <p:nvSpPr>
-          <p:cNvPr id="122" name="CustomShape 1"/>
+          <p:cNvPr id="123" name="CustomShape 1"/>
           <p:cNvSpPr/>
           <p:nvPr/>
         </p:nvSpPr>
         <p:spPr>
           <a:xfrm>
             <a:off x="1261800" y="365760"/>
-            <a:ext cx="9690840" cy="1323720"/>
+            <a:ext cx="9689760" cy="1322640"/>
           </a:xfrm>
           <a:prstGeom prst="rect">
             <a:avLst/>
@@ -5868,14 +5957,14 @@
       </p:sp>
       <p:sp>
         <p:nvSpPr>
-          <p:cNvPr id="123" name="CustomShape 2"/>
+          <p:cNvPr id="124" name="CustomShape 2"/>
           <p:cNvSpPr/>
           <p:nvPr/>
         </p:nvSpPr>
         <p:spPr>
           <a:xfrm>
             <a:off x="1005840" y="1792800"/>
-            <a:ext cx="8595000" cy="2011320"/>
+            <a:ext cx="8593920" cy="2010240"/>
           </a:xfrm>
           <a:prstGeom prst="rect">
             <a:avLst/>
@@ -5896,7 +5985,7 @@
             <a:normAutofit fontScale="85000"/>
           </a:bodyPr>
           <a:p>
-            <a:pPr lvl="4" marL="628560" indent="-188640">
+            <a:pPr lvl="4" marL="628560" indent="-187560">
               <a:lnSpc>
                 <a:spcPct val="150000"/>
               </a:lnSpc>
@@ -5924,7 +6013,7 @@
             </a:endParaRPr>
           </a:p>
           <a:p>
-            <a:pPr lvl="4" marL="628560" indent="-188640">
+            <a:pPr lvl="4" marL="628560" indent="-187560">
               <a:lnSpc>
                 <a:spcPct val="150000"/>
               </a:lnSpc>
@@ -5945,14 +6034,14 @@
                 <a:latin typeface="Arial"/>
                 <a:ea typeface="DejaVu Sans"/>
               </a:rPr>
-              <a:t>MMS thumbnail Media Items view is very visual and easily accessible, no matter the size of your library, MMS help you to keep it manageable</a:t>
+              <a:t>MMS thumbnail Media Items view is very visual and easily accessible, no matter the size of your media library, MMS helps you to keep it manageable</a:t>
             </a:r>
             <a:endParaRPr b="0" lang="en-US" sz="1600" spc="-1" strike="noStrike">
               <a:latin typeface="Arial"/>
             </a:endParaRPr>
           </a:p>
           <a:p>
-            <a:pPr lvl="4" marL="628560" indent="-188640">
+            <a:pPr lvl="4" marL="628560" indent="-187560">
               <a:lnSpc>
                 <a:spcPct val="150000"/>
               </a:lnSpc>
@@ -5973,17 +6062,7 @@
                 <a:latin typeface="Arial"/>
                 <a:ea typeface="DejaVu Sans"/>
               </a:rPr>
-              <a:t> </a:t>
-            </a:r>
-            <a:r>
-              <a:rPr b="0" lang="it-CH" sz="1600" spc="-1" strike="noStrike">
-                <a:solidFill>
-                  <a:srgbClr val="787878"/>
-                </a:solidFill>
-                <a:latin typeface="Arial"/>
-                <a:ea typeface="DejaVu Sans"/>
-              </a:rPr>
-              <a:t>MMS list Media Items view help you to sort media contents based on information such as title and  upload date</a:t>
+              <a:t>List view is also available to help you to sort media contents based on information such as title and  upload date</a:t>
             </a:r>
             <a:endParaRPr b="0" lang="en-US" sz="1600" spc="-1" strike="noStrike">
               <a:latin typeface="Arial"/>
@@ -5993,7 +6072,7 @@
       </p:sp>
       <p:pic>
         <p:nvPicPr>
-          <p:cNvPr id="124" name="" descr=""/>
+          <p:cNvPr id="125" name="" descr=""/>
           <p:cNvPicPr/>
           <p:nvPr/>
         </p:nvPicPr>
@@ -6004,7 +6083,7 @@
         <p:spPr>
           <a:xfrm>
             <a:off x="1815120" y="3823920"/>
-            <a:ext cx="7379280" cy="2691720"/>
+            <a:ext cx="7378200" cy="2690640"/>
           </a:xfrm>
           <a:prstGeom prst="rect">
             <a:avLst/>
@@ -6046,14 +6125,14 @@
       </p:grpSpPr>
       <p:sp>
         <p:nvSpPr>
-          <p:cNvPr id="125" name="CustomShape 1"/>
+          <p:cNvPr id="126" name="CustomShape 1"/>
           <p:cNvSpPr/>
           <p:nvPr/>
         </p:nvSpPr>
         <p:spPr>
           <a:xfrm>
             <a:off x="1261800" y="365760"/>
-            <a:ext cx="9690840" cy="1323720"/>
+            <a:ext cx="9689760" cy="1322640"/>
           </a:xfrm>
           <a:prstGeom prst="rect">
             <a:avLst/>
@@ -6097,14 +6176,14 @@
       </p:sp>
       <p:sp>
         <p:nvSpPr>
-          <p:cNvPr id="126" name="CustomShape 2"/>
+          <p:cNvPr id="127" name="CustomShape 2"/>
           <p:cNvSpPr/>
           <p:nvPr/>
         </p:nvSpPr>
         <p:spPr>
           <a:xfrm>
             <a:off x="1262160" y="1828800"/>
-            <a:ext cx="8593560" cy="4349520"/>
+            <a:ext cx="8592480" cy="4348440"/>
           </a:xfrm>
           <a:prstGeom prst="rect">
             <a:avLst/>
@@ -6125,7 +6204,7 @@
             <a:normAutofit/>
           </a:bodyPr>
           <a:p>
-            <a:pPr lvl="4" marL="628560" indent="-188640">
+            <a:pPr lvl="4" marL="628560" indent="-187560">
               <a:lnSpc>
                 <a:spcPct val="150000"/>
               </a:lnSpc>
@@ -6146,14 +6225,14 @@
                 <a:latin typeface="Arial"/>
                 <a:ea typeface="DejaVu Sans"/>
               </a:rPr>
-              <a:t>MMS does not need any IT support</a:t>
+              <a:t>MMS does not require any IT support</a:t>
             </a:r>
             <a:endParaRPr b="0" lang="en-US" sz="1600" spc="-1" strike="noStrike">
               <a:latin typeface="Arial"/>
             </a:endParaRPr>
           </a:p>
           <a:p>
-            <a:pPr lvl="4" marL="628560" indent="-188640">
+            <a:pPr lvl="4" marL="628560" indent="-187560">
               <a:lnSpc>
                 <a:spcPct val="150000"/>
               </a:lnSpc>
@@ -6174,7 +6253,7 @@
                 <a:latin typeface="Arial"/>
                 <a:ea typeface="DejaVu Sans"/>
               </a:rPr>
-              <a:t>MMS allows you to group Media Contents in Workspaces. For example you can have a Workspace to save all the </a:t>
+              <a:t>MMS allows you to group Media Contents in Workspaces. For example you might have a Workspace to save all the </a:t>
             </a:r>
             <a:r>
               <a:rPr b="0" i="1" lang="it-CH" sz="1600" spc="-1" strike="noStrike">
@@ -6194,54 +6273,14 @@
                 <a:latin typeface="Arial"/>
                 <a:ea typeface="DejaVu Sans"/>
               </a:rPr>
-              <a:t> Media Contents accessible only by the News Editorial Team, and a </a:t>
-            </a:r>
-            <a:r>
-              <a:rPr b="0" i="1" lang="it-CH" sz="1600" spc="-1" strike="noStrike">
-                <a:solidFill>
-                  <a:srgbClr val="787878"/>
-                </a:solidFill>
-                <a:latin typeface="Arial"/>
-                <a:ea typeface="DejaVu Sans"/>
-              </a:rPr>
-              <a:t>Sport</a:t>
-            </a:r>
-            <a:r>
-              <a:rPr b="0" lang="it-CH" sz="1600" spc="-1" strike="noStrike">
-                <a:solidFill>
-                  <a:srgbClr val="787878"/>
-                </a:solidFill>
-                <a:latin typeface="Arial"/>
-                <a:ea typeface="DejaVu Sans"/>
-              </a:rPr>
-              <a:t> Workspace to save all the </a:t>
-            </a:r>
-            <a:r>
-              <a:rPr b="0" i="1" lang="it-CH" sz="1600" spc="-1" strike="noStrike">
-                <a:solidFill>
-                  <a:srgbClr val="787878"/>
-                </a:solidFill>
-                <a:latin typeface="Arial"/>
-                <a:ea typeface="DejaVu Sans"/>
-              </a:rPr>
-              <a:t>Sport</a:t>
-            </a:r>
-            <a:r>
-              <a:rPr b="0" lang="it-CH" sz="1600" spc="-1" strike="noStrike">
-                <a:solidFill>
-                  <a:srgbClr val="787878"/>
-                </a:solidFill>
-                <a:latin typeface="Arial"/>
-                <a:ea typeface="DejaVu Sans"/>
-              </a:rPr>
-              <a:t> Media Contents accessible only by the Sport Editorial Team</a:t>
+              <a:t> Media Contents accessible only by the News Editorial Team, same can be done for other type of contents like Sports, ...</a:t>
             </a:r>
             <a:endParaRPr b="0" lang="en-US" sz="1600" spc="-1" strike="noStrike">
               <a:latin typeface="Arial"/>
             </a:endParaRPr>
           </a:p>
           <a:p>
-            <a:pPr lvl="4" marL="628560" indent="-188640">
+            <a:pPr lvl="4" marL="628560" indent="-187560">
               <a:lnSpc>
                 <a:spcPct val="150000"/>
               </a:lnSpc>
@@ -6262,14 +6301,14 @@
                 <a:latin typeface="Arial"/>
                 <a:ea typeface="DejaVu Sans"/>
               </a:rPr>
-              <a:t>Upload of Media Contents is done easily by drag and drop or providing a URL to MMS to upload the media content. In caso of content too large, like videos, it is also possible to upload the content spliting it in chunks</a:t>
+              <a:t>Upload of Media Contents is done easily by drag and drop or providing a URL to upload the content. In caso of videos too large it is also possible to upload the content spliting it in chunks</a:t>
             </a:r>
             <a:endParaRPr b="0" lang="en-US" sz="1600" spc="-1" strike="noStrike">
               <a:latin typeface="Arial"/>
             </a:endParaRPr>
           </a:p>
           <a:p>
-            <a:pPr lvl="4" marL="628560" indent="-188640">
+            <a:pPr lvl="4" marL="628560" indent="-187560">
               <a:lnSpc>
                 <a:spcPct val="150000"/>
               </a:lnSpc>
@@ -6290,14 +6329,14 @@
                 <a:latin typeface="Arial"/>
                 <a:ea typeface="DejaVu Sans"/>
               </a:rPr>
-              <a:t>Metadata can be associated to each content: title, tags, description and any user data information</a:t>
+              <a:t>Metadata can be associated to each media content: title, tags, description and any user data information.</a:t>
             </a:r>
             <a:endParaRPr b="0" lang="en-US" sz="1600" spc="-1" strike="noStrike">
               <a:latin typeface="Arial"/>
             </a:endParaRPr>
           </a:p>
           <a:p>
-            <a:pPr lvl="4" marL="628560" indent="-188640">
+            <a:pPr lvl="4" marL="628560" indent="-187560">
               <a:lnSpc>
                 <a:spcPct val="150000"/>
               </a:lnSpc>
@@ -6318,7 +6357,7 @@
                 <a:latin typeface="Arial"/>
                 <a:ea typeface="DejaVu Sans"/>
               </a:rPr>
-              <a:t>Metadata will help you to find the media contents using the Advanced Search dialog</a:t>
+              <a:t>Metadata can be used to will help you to find the media contents</a:t>
             </a:r>
             <a:endParaRPr b="0" lang="en-US" sz="1600" spc="-1" strike="noStrike">
               <a:latin typeface="Arial"/>
@@ -6358,14 +6397,14 @@
       </p:grpSpPr>
       <p:sp>
         <p:nvSpPr>
-          <p:cNvPr id="127" name="CustomShape 1"/>
+          <p:cNvPr id="128" name="CustomShape 1"/>
           <p:cNvSpPr/>
           <p:nvPr/>
         </p:nvSpPr>
         <p:spPr>
           <a:xfrm>
             <a:off x="1261800" y="365760"/>
-            <a:ext cx="9690840" cy="1323720"/>
+            <a:ext cx="9689760" cy="1322640"/>
           </a:xfrm>
           <a:prstGeom prst="rect">
             <a:avLst/>
@@ -6409,14 +6448,14 @@
       </p:sp>
       <p:sp>
         <p:nvSpPr>
-          <p:cNvPr id="128" name="CustomShape 2"/>
+          <p:cNvPr id="129" name="CustomShape 2"/>
           <p:cNvSpPr/>
           <p:nvPr/>
         </p:nvSpPr>
         <p:spPr>
           <a:xfrm>
             <a:off x="1261800" y="1828800"/>
-            <a:ext cx="5595480" cy="2193840"/>
+            <a:ext cx="5594400" cy="2192760"/>
           </a:xfrm>
           <a:prstGeom prst="rect">
             <a:avLst/>
@@ -6437,7 +6476,7 @@
             <a:normAutofit/>
           </a:bodyPr>
           <a:p>
-            <a:pPr lvl="4" marL="628560" indent="-188640">
+            <a:pPr lvl="4" marL="628560" indent="-187560">
               <a:lnSpc>
                 <a:spcPct val="150000"/>
               </a:lnSpc>
@@ -6465,7 +6504,7 @@
             </a:endParaRPr>
           </a:p>
           <a:p>
-            <a:pPr lvl="4" marL="628560" indent="-188640">
+            <a:pPr lvl="4" marL="628560" indent="-187560">
               <a:lnSpc>
                 <a:spcPct val="150000"/>
               </a:lnSpc>
@@ -6493,7 +6532,7 @@
             </a:endParaRPr>
           </a:p>
           <a:p>
-            <a:pPr lvl="4" marL="628560" indent="-188640">
+            <a:pPr lvl="4" marL="628560" indent="-187560">
               <a:lnSpc>
                 <a:spcPct val="150000"/>
               </a:lnSpc>
@@ -6521,7 +6560,7 @@
             </a:endParaRPr>
           </a:p>
           <a:p>
-            <a:pPr lvl="4" marL="628560" indent="-188640">
+            <a:pPr lvl="4" marL="628560" indent="-187560">
               <a:lnSpc>
                 <a:spcPct val="150000"/>
               </a:lnSpc>
@@ -6565,7 +6604,7 @@
       </p:sp>
       <p:pic>
         <p:nvPicPr>
-          <p:cNvPr id="129" name="" descr=""/>
+          <p:cNvPr id="130" name="" descr=""/>
           <p:cNvPicPr/>
           <p:nvPr/>
         </p:nvPicPr>
@@ -6576,7 +6615,7 @@
         <p:spPr>
           <a:xfrm>
             <a:off x="1953000" y="3895920"/>
-            <a:ext cx="7632000" cy="2833920"/>
+            <a:ext cx="7630920" cy="2832840"/>
           </a:xfrm>
           <a:prstGeom prst="rect">
             <a:avLst/>
@@ -6588,14 +6627,14 @@
       </p:pic>
       <p:sp>
         <p:nvSpPr>
-          <p:cNvPr id="130" name="CustomShape 3"/>
+          <p:cNvPr id="131" name="CustomShape 3"/>
           <p:cNvSpPr/>
           <p:nvPr/>
         </p:nvSpPr>
         <p:spPr>
           <a:xfrm>
             <a:off x="5760720" y="1828800"/>
-            <a:ext cx="4094640" cy="2303640"/>
+            <a:ext cx="4093560" cy="2302560"/>
           </a:xfrm>
           <a:prstGeom prst="rect">
             <a:avLst/>
@@ -6616,7 +6655,7 @@
             <a:normAutofit/>
           </a:bodyPr>
           <a:p>
-            <a:pPr lvl="4" marL="628560" indent="-188640">
+            <a:pPr lvl="4" marL="628560" indent="-187560">
               <a:lnSpc>
                 <a:spcPct val="150000"/>
               </a:lnSpc>
@@ -6644,7 +6683,7 @@
             </a:endParaRPr>
           </a:p>
           <a:p>
-            <a:pPr lvl="4" marL="628560" indent="-188640">
+            <a:pPr lvl="4" marL="628560" indent="-187560">
               <a:lnSpc>
                 <a:spcPct val="150000"/>
               </a:lnSpc>
@@ -6672,7 +6711,7 @@
             </a:endParaRPr>
           </a:p>
           <a:p>
-            <a:pPr lvl="4" marL="628560" indent="-188640">
+            <a:pPr lvl="4" marL="628560" indent="-187560">
               <a:lnSpc>
                 <a:spcPct val="150000"/>
               </a:lnSpc>
@@ -6746,14 +6785,14 @@
       </p:grpSpPr>
       <p:sp>
         <p:nvSpPr>
-          <p:cNvPr id="131" name="CustomShape 1"/>
+          <p:cNvPr id="132" name="CustomShape 1"/>
           <p:cNvSpPr/>
           <p:nvPr/>
         </p:nvSpPr>
         <p:spPr>
           <a:xfrm>
             <a:off x="1261800" y="365760"/>
-            <a:ext cx="9690840" cy="1323720"/>
+            <a:ext cx="9689760" cy="1322640"/>
           </a:xfrm>
           <a:prstGeom prst="rect">
             <a:avLst/>
@@ -6797,14 +6836,14 @@
       </p:sp>
       <p:sp>
         <p:nvSpPr>
-          <p:cNvPr id="132" name="CustomShape 2"/>
+          <p:cNvPr id="133" name="CustomShape 2"/>
           <p:cNvSpPr/>
           <p:nvPr/>
         </p:nvSpPr>
         <p:spPr>
           <a:xfrm>
             <a:off x="6019920" y="1831680"/>
-            <a:ext cx="4680000" cy="4349520"/>
+            <a:ext cx="4678920" cy="4348440"/>
           </a:xfrm>
           <a:prstGeom prst="rect">
             <a:avLst/>
@@ -6825,7 +6864,7 @@
             <a:normAutofit/>
           </a:bodyPr>
           <a:p>
-            <a:pPr lvl="4" marL="628560" indent="-188640">
+            <a:pPr lvl="4" marL="628560" indent="-187560">
               <a:lnSpc>
                 <a:spcPct val="150000"/>
               </a:lnSpc>
@@ -6853,7 +6892,7 @@
             </a:endParaRPr>
           </a:p>
           <a:p>
-            <a:pPr lvl="4" marL="628560" indent="-188640">
+            <a:pPr lvl="4" marL="628560" indent="-187560">
               <a:lnSpc>
                 <a:spcPct val="150000"/>
               </a:lnSpc>
@@ -6881,7 +6920,7 @@
             </a:endParaRPr>
           </a:p>
           <a:p>
-            <a:pPr lvl="4" marL="628560" indent="-188640">
+            <a:pPr lvl="4" marL="628560" indent="-187560">
               <a:lnSpc>
                 <a:spcPct val="150000"/>
               </a:lnSpc>
@@ -6909,7 +6948,7 @@
             </a:endParaRPr>
           </a:p>
           <a:p>
-            <a:pPr lvl="4" marL="628560" indent="-188640">
+            <a:pPr lvl="4" marL="628560" indent="-187560">
               <a:lnSpc>
                 <a:spcPct val="150000"/>
               </a:lnSpc>
@@ -6937,7 +6976,7 @@
             </a:endParaRPr>
           </a:p>
           <a:p>
-            <a:pPr lvl="4" marL="628560" indent="-188640">
+            <a:pPr lvl="4" marL="628560" indent="-187560">
               <a:lnSpc>
                 <a:spcPct val="150000"/>
               </a:lnSpc>
@@ -6965,7 +7004,7 @@
             </a:endParaRPr>
           </a:p>
           <a:p>
-            <a:pPr lvl="4" marL="628560" indent="-188640">
+            <a:pPr lvl="4" marL="628560" indent="-187560">
               <a:lnSpc>
                 <a:spcPct val="150000"/>
               </a:lnSpc>
@@ -6993,7 +7032,7 @@
             </a:endParaRPr>
           </a:p>
           <a:p>
-            <a:pPr lvl="4" marL="628560" indent="-188640">
+            <a:pPr lvl="4" marL="628560" indent="-187560">
               <a:lnSpc>
                 <a:spcPct val="150000"/>
               </a:lnSpc>
@@ -7021,7 +7060,7 @@
             </a:endParaRPr>
           </a:p>
           <a:p>
-            <a:pPr lvl="4" marL="628560" indent="-188640">
+            <a:pPr lvl="4" marL="628560" indent="-187560">
               <a:lnSpc>
                 <a:spcPct val="150000"/>
               </a:lnSpc>
@@ -7049,7 +7088,7 @@
             </a:endParaRPr>
           </a:p>
           <a:p>
-            <a:pPr lvl="4" marL="628560" indent="-188640">
+            <a:pPr lvl="4" marL="628560" indent="-187560">
               <a:lnSpc>
                 <a:spcPct val="150000"/>
               </a:lnSpc>
@@ -7077,7 +7116,7 @@
             </a:endParaRPr>
           </a:p>
           <a:p>
-            <a:pPr lvl="4" marL="628560" indent="-188640">
+            <a:pPr lvl="4" marL="628560" indent="-187560">
               <a:lnSpc>
                 <a:spcPct val="150000"/>
               </a:lnSpc>
@@ -7127,14 +7166,14 @@
       </p:sp>
       <p:sp>
         <p:nvSpPr>
-          <p:cNvPr id="133" name="CustomShape 3"/>
+          <p:cNvPr id="134" name="CustomShape 3"/>
           <p:cNvSpPr/>
           <p:nvPr/>
         </p:nvSpPr>
         <p:spPr>
           <a:xfrm>
             <a:off x="1262160" y="1828800"/>
-            <a:ext cx="4680000" cy="4349520"/>
+            <a:ext cx="4678920" cy="4348440"/>
           </a:xfrm>
           <a:prstGeom prst="rect">
             <a:avLst/>
@@ -7152,10 +7191,10 @@
         </p:style>
         <p:txBody>
           <a:bodyPr lIns="90000" rIns="90000" tIns="45000" bIns="45000">
-            <a:normAutofit fontScale="79000"/>
-          </a:bodyPr>
-          <a:p>
-            <a:pPr lvl="4" marL="628560" indent="-188640">
+            <a:normAutofit fontScale="78000"/>
+          </a:bodyPr>
+          <a:p>
+            <a:pPr lvl="4" marL="628560" indent="-187560">
               <a:lnSpc>
                 <a:spcPct val="150000"/>
               </a:lnSpc>
@@ -7183,7 +7222,7 @@
             </a:endParaRPr>
           </a:p>
           <a:p>
-            <a:pPr lvl="4" marL="628560" indent="-188640">
+            <a:pPr lvl="4" marL="628560" indent="-187560">
               <a:lnSpc>
                 <a:spcPct val="150000"/>
               </a:lnSpc>
@@ -7211,7 +7250,7 @@
             </a:endParaRPr>
           </a:p>
           <a:p>
-            <a:pPr lvl="4" marL="628560" indent="-188640">
+            <a:pPr lvl="4" marL="628560" indent="-187560">
               <a:lnSpc>
                 <a:spcPct val="150000"/>
               </a:lnSpc>
@@ -7239,7 +7278,7 @@
             </a:endParaRPr>
           </a:p>
           <a:p>
-            <a:pPr lvl="4" marL="628560" indent="-188640">
+            <a:pPr lvl="4" marL="628560" indent="-187560">
               <a:lnSpc>
                 <a:spcPct val="150000"/>
               </a:lnSpc>
@@ -7267,7 +7306,7 @@
             </a:endParaRPr>
           </a:p>
           <a:p>
-            <a:pPr lvl="4" marL="628560" indent="-188640">
+            <a:pPr lvl="4" marL="628560" indent="-187560">
               <a:lnSpc>
                 <a:spcPct val="150000"/>
               </a:lnSpc>
@@ -7295,7 +7334,7 @@
             </a:endParaRPr>
           </a:p>
           <a:p>
-            <a:pPr lvl="4" marL="628560" indent="-188640">
+            <a:pPr lvl="4" marL="628560" indent="-187560">
               <a:lnSpc>
                 <a:spcPct val="150000"/>
               </a:lnSpc>
@@ -7323,7 +7362,7 @@
             </a:endParaRPr>
           </a:p>
           <a:p>
-            <a:pPr lvl="4" marL="628560" indent="-188640">
+            <a:pPr lvl="4" marL="628560" indent="-187560">
               <a:lnSpc>
                 <a:spcPct val="150000"/>
               </a:lnSpc>
@@ -7351,7 +7390,7 @@
             </a:endParaRPr>
           </a:p>
           <a:p>
-            <a:pPr lvl="4" marL="628560" indent="-188640">
+            <a:pPr lvl="4" marL="628560" indent="-187560">
               <a:lnSpc>
                 <a:spcPct val="150000"/>
               </a:lnSpc>
@@ -7379,7 +7418,7 @@
             </a:endParaRPr>
           </a:p>
           <a:p>
-            <a:pPr lvl="4" marL="628560" indent="-188640">
+            <a:pPr lvl="4" marL="628560" indent="-187560">
               <a:lnSpc>
                 <a:spcPct val="150000"/>
               </a:lnSpc>
@@ -7407,7 +7446,7 @@
             </a:endParaRPr>
           </a:p>
           <a:p>
-            <a:pPr lvl="4" marL="628560" indent="-188640">
+            <a:pPr lvl="4" marL="628560" indent="-187560">
               <a:lnSpc>
                 <a:spcPct val="150000"/>
               </a:lnSpc>
@@ -7435,7 +7474,7 @@
             </a:endParaRPr>
           </a:p>
           <a:p>
-            <a:pPr lvl="4" marL="628560" indent="-188640">
+            <a:pPr lvl="4" marL="628560" indent="-187560">
               <a:lnSpc>
                 <a:spcPct val="150000"/>
               </a:lnSpc>
@@ -7496,14 +7535,14 @@
       </p:grpSpPr>
       <p:sp>
         <p:nvSpPr>
-          <p:cNvPr id="134" name="CustomShape 1"/>
+          <p:cNvPr id="135" name="CustomShape 1"/>
           <p:cNvSpPr/>
           <p:nvPr/>
         </p:nvSpPr>
         <p:spPr>
           <a:xfrm>
             <a:off x="1261800" y="365760"/>
-            <a:ext cx="9690840" cy="1323720"/>
+            <a:ext cx="9689760" cy="1322640"/>
           </a:xfrm>
           <a:prstGeom prst="rect">
             <a:avLst/>
@@ -7547,14 +7586,14 @@
       </p:sp>
       <p:sp>
         <p:nvSpPr>
-          <p:cNvPr id="135" name="CustomShape 2"/>
+          <p:cNvPr id="136" name="CustomShape 2"/>
           <p:cNvSpPr/>
           <p:nvPr/>
         </p:nvSpPr>
         <p:spPr>
           <a:xfrm>
             <a:off x="1261800" y="1828800"/>
-            <a:ext cx="8593560" cy="4349520"/>
+            <a:ext cx="8592480" cy="4348440"/>
           </a:xfrm>
           <a:prstGeom prst="rect">
             <a:avLst/>
@@ -7575,7 +7614,7 @@
             <a:normAutofit/>
           </a:bodyPr>
           <a:p>
-            <a:pPr lvl="4" marL="628560" indent="-188640">
+            <a:pPr lvl="4" marL="628560" indent="-187560">
               <a:lnSpc>
                 <a:spcPct val="150000"/>
               </a:lnSpc>
@@ -7596,14 +7635,14 @@
                 <a:latin typeface="Arial"/>
                 <a:ea typeface="DejaVu Sans"/>
               </a:rPr>
-              <a:t>Live Stream Cloud Ingest (UDP, RTP, SRT, RTMP, HTTP HLS, ecc)</a:t>
+              <a:t>Live Stream Cloud Ingest (UDP, RTP, SRT, RTMP, HTTP HLS, ...)</a:t>
             </a:r>
             <a:endParaRPr b="0" lang="en-US" sz="1640" spc="-1" strike="noStrike">
               <a:latin typeface="Arial"/>
             </a:endParaRPr>
           </a:p>
           <a:p>
-            <a:pPr lvl="4" marL="628560" indent="-188640">
+            <a:pPr lvl="4" marL="628560" indent="-187560">
               <a:lnSpc>
                 <a:spcPct val="150000"/>
               </a:lnSpc>
@@ -7631,7 +7670,7 @@
             </a:endParaRPr>
           </a:p>
           <a:p>
-            <a:pPr lvl="4" marL="628560" indent="-188640">
+            <a:pPr lvl="4" marL="628560" indent="-187560">
               <a:lnSpc>
                 <a:spcPct val="150000"/>
               </a:lnSpc>
@@ -7659,7 +7698,7 @@
             </a:endParaRPr>
           </a:p>
           <a:p>
-            <a:pPr lvl="4" marL="628560" indent="-188640">
+            <a:pPr lvl="4" marL="628560" indent="-187560">
               <a:lnSpc>
                 <a:spcPct val="150000"/>
               </a:lnSpc>
@@ -7687,7 +7726,7 @@
             </a:endParaRPr>
           </a:p>
           <a:p>
-            <a:pPr lvl="4" marL="628560" indent="-188640">
+            <a:pPr lvl="4" marL="628560" indent="-187560">
               <a:lnSpc>
                 <a:spcPct val="150000"/>
               </a:lnSpc>
@@ -7715,7 +7754,7 @@
             </a:endParaRPr>
           </a:p>
           <a:p>
-            <a:pPr lvl="4" marL="628560" indent="-188640">
+            <a:pPr lvl="4" marL="628560" indent="-187560">
               <a:lnSpc>
                 <a:spcPct val="150000"/>
               </a:lnSpc>
@@ -7743,7 +7782,7 @@
             </a:endParaRPr>
           </a:p>
           <a:p>
-            <a:pPr lvl="4" marL="628560" indent="-188640">
+            <a:pPr lvl="4" marL="628560" indent="-187560">
               <a:lnSpc>
                 <a:spcPct val="150000"/>
               </a:lnSpc>
@@ -7787,7 +7826,7 @@
       </p:sp>
       <p:pic>
         <p:nvPicPr>
-          <p:cNvPr id="136" name="" descr=""/>
+          <p:cNvPr id="137" name="" descr=""/>
           <p:cNvPicPr/>
           <p:nvPr/>
         </p:nvPicPr>
@@ -7798,7 +7837,7 @@
         <p:spPr>
           <a:xfrm>
             <a:off x="3866400" y="4937760"/>
-            <a:ext cx="6373440" cy="1651680"/>
+            <a:ext cx="6372360" cy="1650600"/>
           </a:xfrm>
           <a:prstGeom prst="rect">
             <a:avLst/>
@@ -7840,14 +7879,14 @@
       </p:grpSpPr>
       <p:sp>
         <p:nvSpPr>
-          <p:cNvPr id="137" name="CustomShape 1"/>
+          <p:cNvPr id="138" name="CustomShape 1"/>
           <p:cNvSpPr/>
           <p:nvPr/>
         </p:nvSpPr>
         <p:spPr>
           <a:xfrm>
             <a:off x="1261800" y="365760"/>
-            <a:ext cx="9690840" cy="1323720"/>
+            <a:ext cx="9689760" cy="1322640"/>
           </a:xfrm>
           <a:prstGeom prst="rect">
             <a:avLst/>
@@ -7891,14 +7930,14 @@
       </p:sp>
       <p:sp>
         <p:nvSpPr>
-          <p:cNvPr id="138" name="CustomShape 2"/>
+          <p:cNvPr id="139" name="CustomShape 2"/>
           <p:cNvSpPr/>
           <p:nvPr/>
         </p:nvSpPr>
         <p:spPr>
           <a:xfrm>
             <a:off x="1261800" y="1828800"/>
-            <a:ext cx="8593560" cy="4349520"/>
+            <a:ext cx="8592480" cy="4348440"/>
           </a:xfrm>
           <a:prstGeom prst="rect">
             <a:avLst/>
@@ -7919,7 +7958,7 @@
             <a:normAutofit/>
           </a:bodyPr>
           <a:p>
-            <a:pPr lvl="4" marL="628560" indent="-188640">
+            <a:pPr lvl="4" marL="628560" indent="-187560">
               <a:lnSpc>
                 <a:spcPct val="150000"/>
               </a:lnSpc>
@@ -7947,7 +7986,7 @@
             </a:endParaRPr>
           </a:p>
           <a:p>
-            <a:pPr lvl="4" marL="628560" indent="-188640">
+            <a:pPr lvl="4" marL="628560" indent="-187560">
               <a:lnSpc>
                 <a:spcPct val="150000"/>
               </a:lnSpc>
@@ -7975,7 +8014,7 @@
             </a:endParaRPr>
           </a:p>
           <a:p>
-            <a:pPr lvl="4" marL="628560" indent="-188640">
+            <a:pPr lvl="4" marL="628560" indent="-187560">
               <a:lnSpc>
                 <a:spcPct val="150000"/>
               </a:lnSpc>
@@ -8003,7 +8042,7 @@
             </a:endParaRPr>
           </a:p>
           <a:p>
-            <a:pPr lvl="4" marL="628560" indent="-188640">
+            <a:pPr lvl="4" marL="628560" indent="-187560">
               <a:lnSpc>
                 <a:spcPct val="150000"/>
               </a:lnSpc>
@@ -8034,7 +8073,7 @@
       </p:sp>
       <p:pic>
         <p:nvPicPr>
-          <p:cNvPr id="139" name="" descr=""/>
+          <p:cNvPr id="140" name="" descr=""/>
           <p:cNvPicPr/>
           <p:nvPr/>
         </p:nvPicPr>
@@ -8045,7 +8084,7 @@
         <p:spPr>
           <a:xfrm>
             <a:off x="2003040" y="3530160"/>
-            <a:ext cx="8010000" cy="3194640"/>
+            <a:ext cx="8008920" cy="3193560"/>
           </a:xfrm>
           <a:prstGeom prst="rect">
             <a:avLst/>
@@ -8087,14 +8126,14 @@
       </p:grpSpPr>
       <p:sp>
         <p:nvSpPr>
-          <p:cNvPr id="140" name="CustomShape 1"/>
+          <p:cNvPr id="141" name="CustomShape 1"/>
           <p:cNvSpPr/>
           <p:nvPr/>
         </p:nvSpPr>
         <p:spPr>
           <a:xfrm>
             <a:off x="1261800" y="365760"/>
-            <a:ext cx="9690840" cy="1323720"/>
+            <a:ext cx="9689760" cy="1322640"/>
           </a:xfrm>
           <a:prstGeom prst="rect">
             <a:avLst/>
@@ -8138,14 +8177,14 @@
       </p:sp>
       <p:sp>
         <p:nvSpPr>
-          <p:cNvPr id="141" name="CustomShape 2"/>
+          <p:cNvPr id="142" name="CustomShape 2"/>
           <p:cNvSpPr/>
           <p:nvPr/>
         </p:nvSpPr>
         <p:spPr>
           <a:xfrm>
             <a:off x="1261800" y="1828800"/>
-            <a:ext cx="8593560" cy="4349520"/>
+            <a:ext cx="8592480" cy="4348440"/>
           </a:xfrm>
           <a:prstGeom prst="rect">
             <a:avLst/>
@@ -8166,7 +8205,7 @@
             <a:normAutofit/>
           </a:bodyPr>
           <a:p>
-            <a:pPr lvl="4" marL="628560" indent="-188640">
+            <a:pPr lvl="4" marL="628560" indent="-187560">
               <a:lnSpc>
                 <a:spcPct val="150000"/>
               </a:lnSpc>
@@ -8194,7 +8233,7 @@
             </a:endParaRPr>
           </a:p>
           <a:p>
-            <a:pPr lvl="4" marL="628560" indent="-188640">
+            <a:pPr lvl="4" marL="628560" indent="-187560">
               <a:lnSpc>
                 <a:spcPct val="150000"/>
               </a:lnSpc>
@@ -8222,7 +8261,7 @@
             </a:endParaRPr>
           </a:p>
           <a:p>
-            <a:pPr lvl="4" marL="628560" indent="-188640">
+            <a:pPr lvl="4" marL="628560" indent="-187560">
               <a:lnSpc>
                 <a:spcPct val="150000"/>
               </a:lnSpc>
@@ -8250,7 +8289,7 @@
             </a:endParaRPr>
           </a:p>
           <a:p>
-            <a:pPr lvl="4" marL="628560" indent="-188640">
+            <a:pPr lvl="4" marL="628560" indent="-187560">
               <a:lnSpc>
                 <a:spcPct val="150000"/>
               </a:lnSpc>
@@ -8278,7 +8317,7 @@
             </a:endParaRPr>
           </a:p>
           <a:p>
-            <a:pPr lvl="4" marL="628560" indent="-188640">
+            <a:pPr lvl="4" marL="628560" indent="-187560">
               <a:lnSpc>
                 <a:spcPct val="150000"/>
               </a:lnSpc>
@@ -8306,7 +8345,7 @@
             </a:endParaRPr>
           </a:p>
           <a:p>
-            <a:pPr lvl="4" marL="628560" indent="-188640">
+            <a:pPr lvl="4" marL="628560" indent="-187560">
               <a:lnSpc>
                 <a:spcPct val="150000"/>
               </a:lnSpc>
@@ -8356,7 +8395,7 @@
       </p:sp>
       <p:pic>
         <p:nvPicPr>
-          <p:cNvPr id="142" name="" descr=""/>
+          <p:cNvPr id="143" name="" descr=""/>
           <p:cNvPicPr/>
           <p:nvPr/>
         </p:nvPicPr>
@@ -8367,7 +8406,7 @@
         <p:spPr>
           <a:xfrm>
             <a:off x="1798560" y="4554000"/>
-            <a:ext cx="9015840" cy="2067120"/>
+            <a:ext cx="9014760" cy="2066040"/>
           </a:xfrm>
           <a:prstGeom prst="rect">
             <a:avLst/>

</xml_diff>